<commit_message>
updated slides by Eric Vyncke
</commit_message>
<xml_diff>
--- a/post-sockets/Eric Vyncke - work on pvd.pptx
+++ b/post-sockets/Eric Vyncke - work on pvd.pptx
@@ -5,17 +5,18 @@
     <p:sldMasterId id="2147483649" r:id="rId1"/>
   </p:sldMasterIdLst>
   <p:notesMasterIdLst>
-    <p:notesMasterId r:id="rId7"/>
+    <p:notesMasterId r:id="rId8"/>
   </p:notesMasterIdLst>
   <p:handoutMasterIdLst>
-    <p:handoutMasterId r:id="rId8"/>
+    <p:handoutMasterId r:id="rId9"/>
   </p:handoutMasterIdLst>
   <p:sldIdLst>
     <p:sldId id="267" r:id="rId2"/>
     <p:sldId id="269" r:id="rId3"/>
     <p:sldId id="268" r:id="rId4"/>
-    <p:sldId id="270" r:id="rId5"/>
-    <p:sldId id="272" r:id="rId6"/>
+    <p:sldId id="272" r:id="rId5"/>
+    <p:sldId id="270" r:id="rId6"/>
+    <p:sldId id="273" r:id="rId7"/>
   </p:sldIdLst>
   <p:sldSz cx="9144000" cy="6858000" type="screen4x3"/>
   <p:notesSz cx="7315200" cy="9601200"/>
@@ -1009,7 +1010,7 @@
             <a:fld id="{7B98B4A8-B568-4FB0-B0A4-542F674B0B69}" type="slidenum">
               <a:rPr lang="en-US" altLang="en-US" smtClean="0"/>
               <a:pPr/>
-              <a:t>5</a:t>
+              <a:t>4</a:t>
             </a:fld>
             <a:endParaRPr lang="en-US" altLang="en-US"/>
           </a:p>
@@ -1926,14 +1927,14 @@
               <ma14:placeholderFlag xmlns:ma14="http://schemas.microsoft.com/office/mac/drawingml/2011/main" val="1"/>
             </a:ext>
             <a:ext uri="{909E8E84-426E-40dd-AFC4-6F175D3DCCD1}">
-              <a14:hiddenFill xmlns="" xmlns:a14="http://schemas.microsoft.com/office/drawing/2010/main">
+              <a14:hiddenFill xmlns:a14="http://schemas.microsoft.com/office/drawing/2010/main" xmlns="">
                 <a:solidFill>
                   <a:srgbClr val="FFFFFF"/>
                 </a:solidFill>
               </a14:hiddenFill>
             </a:ext>
             <a:ext uri="{91240B29-F687-4f45-9708-019B960494DF}">
-              <a14:hiddenLine xmlns="" xmlns:a14="http://schemas.microsoft.com/office/drawing/2010/main" w="9525">
+              <a14:hiddenLine xmlns:a14="http://schemas.microsoft.com/office/drawing/2010/main" xmlns="" w="9525">
                 <a:solidFill>
                   <a:srgbClr val="000000"/>
                 </a:solidFill>
@@ -4876,7 +4877,6 @@
               <a:rPr lang="en-US" sz="4000" dirty="0" smtClean="0"/>
               <a:t>Provisioning Domains</a:t>
             </a:r>
-            <a:endParaRPr lang="en-US" sz="4000" dirty="0" smtClean="0"/>
           </a:p>
         </p:txBody>
       </p:sp>
@@ -4939,11 +4939,7 @@
             </a:r>
             <a:r>
               <a:rPr lang="en-US" sz="3000" dirty="0" smtClean="0"/>
-              <a:t>, E</a:t>
-            </a:r>
-            <a:r>
-              <a:rPr lang="en-US" sz="3000" dirty="0" smtClean="0"/>
-              <a:t>. </a:t>
+              <a:t>, E. </a:t>
             </a:r>
             <a:r>
               <a:rPr lang="en-US" sz="3000" dirty="0" err="1" smtClean="0"/>
@@ -4994,17 +4990,8 @@
               <a:rPr lang="en-US" sz="2000" dirty="0" smtClean="0">
                 <a:latin typeface="Verdana" pitchFamily="34" charset="0"/>
               </a:rPr>
-              <a:t> </a:t>
-            </a:r>
-            <a:r>
-              <a:rPr lang="en-US" sz="2000" dirty="0" smtClean="0">
-                <a:latin typeface="Verdana" pitchFamily="34" charset="0"/>
-              </a:rPr>
-              <a:t>98, March 2017</a:t>
-            </a:r>
-            <a:endParaRPr lang="en-US" sz="2000" dirty="0" smtClean="0">
-              <a:latin typeface="Verdana" pitchFamily="34" charset="0"/>
-            </a:endParaRPr>
+              <a:t> 98, March 2017</a:t>
+            </a:r>
           </a:p>
           <a:p>
             <a:pPr eaLnBrk="0" hangingPunct="0"/>
@@ -5197,8 +5184,25 @@
             <a:pPr lvl="1"/>
             <a:r>
               <a:rPr lang="en-US" sz="2000" dirty="0" smtClean="0"/>
-              <a:t>Maximum Throughput &amp; cost</a:t>
-            </a:r>
+              <a:t>Maximum </a:t>
+            </a:r>
+            <a:r>
+              <a:rPr lang="en-US" sz="2000" dirty="0" smtClean="0"/>
+              <a:t>Throughput, latency</a:t>
+            </a:r>
+            <a:endParaRPr lang="en-US" sz="2000" dirty="0"/>
+          </a:p>
+          <a:p>
+            <a:pPr lvl="1"/>
+            <a:r>
+              <a:rPr lang="en-US" sz="2000" dirty="0" smtClean="0"/>
+              <a:t>Financial c</a:t>
+            </a:r>
+            <a:r>
+              <a:rPr lang="en-US" sz="2000" dirty="0" smtClean="0"/>
+              <a:t>ost structure</a:t>
+            </a:r>
+            <a:endParaRPr lang="en-US" sz="2000" dirty="0" smtClean="0"/>
           </a:p>
           <a:p>
             <a:pPr lvl="1"/>
@@ -5236,6 +5240,13 @@
   <p:clrMapOvr>
     <a:masterClrMapping/>
   </p:clrMapOvr>
+  <p:timing>
+    <p:tnLst>
+      <p:par>
+        <p:cTn id="1" dur="indefinite" restart="never" nodeType="tmRoot"/>
+      </p:par>
+    </p:tnLst>
+  </p:timing>
 </p:sld>
 </file>
 
@@ -5818,216 +5829,6 @@
 </file>
 
 <file path=ppt/slides/slide4.xml><?xml version="1.0" encoding="utf-8"?>
-<p:sld xmlns:a="http://schemas.openxmlformats.org/drawingml/2006/main" xmlns:r="http://schemas.openxmlformats.org/officeDocument/2006/relationships" xmlns:p="http://schemas.openxmlformats.org/presentationml/2006/main">
-  <p:cSld>
-    <p:spTree>
-      <p:nvGrpSpPr>
-        <p:cNvPr id="1" name=""/>
-        <p:cNvGrpSpPr/>
-        <p:nvPr/>
-      </p:nvGrpSpPr>
-      <p:grpSpPr>
-        <a:xfrm>
-          <a:off x="0" y="0"/>
-          <a:ext cx="0" cy="0"/>
-          <a:chOff x="0" y="0"/>
-          <a:chExt cx="0" cy="0"/>
-        </a:xfrm>
-      </p:grpSpPr>
-      <p:sp>
-        <p:nvSpPr>
-          <p:cNvPr id="2" name="Text Placeholder 1"/>
-          <p:cNvSpPr>
-            <a:spLocks noGrp="1"/>
-          </p:cNvSpPr>
-          <p:nvPr>
-            <p:ph type="body" sz="quarter" idx="10"/>
-          </p:nvPr>
-        </p:nvSpPr>
-        <p:spPr/>
-        <p:txBody>
-          <a:bodyPr/>
-          <a:lstStyle/>
-          <a:p>
-            <a:r>
-              <a:rPr lang="en-US" sz="2400" dirty="0" smtClean="0"/>
-              <a:t>Bootstrap </a:t>
-            </a:r>
-            <a:r>
-              <a:rPr lang="en-US" sz="2400" dirty="0" err="1" smtClean="0"/>
-              <a:t>PvD</a:t>
-            </a:r>
-            <a:r>
-              <a:rPr lang="en-US" sz="2400" dirty="0" smtClean="0"/>
-              <a:t> information added to IPv6 Router Advertisement</a:t>
-            </a:r>
-          </a:p>
-          <a:p>
-            <a:pPr lvl="1"/>
-            <a:r>
-              <a:rPr lang="en-US" sz="2000" dirty="0" err="1" smtClean="0"/>
-              <a:t>PvD</a:t>
-            </a:r>
-            <a:r>
-              <a:rPr lang="en-US" sz="2000" dirty="0" smtClean="0"/>
-              <a:t> applies to all Prefix Information Options (PIO)</a:t>
-            </a:r>
-          </a:p>
-          <a:p>
-            <a:pPr lvl="2"/>
-            <a:r>
-              <a:rPr lang="en-US" sz="1800" dirty="0" smtClean="0"/>
-              <a:t>Use multiple RA if the </a:t>
-            </a:r>
-            <a:r>
-              <a:rPr lang="en-US" sz="1800" dirty="0" err="1" smtClean="0"/>
-              <a:t>PvD</a:t>
-            </a:r>
-            <a:r>
-              <a:rPr lang="en-US" sz="1800" dirty="0" smtClean="0"/>
-              <a:t> is not to be shared among PIO</a:t>
-            </a:r>
-          </a:p>
-          <a:p>
-            <a:pPr lvl="2"/>
-            <a:r>
-              <a:rPr lang="en-US" sz="1800" dirty="0" err="1" smtClean="0"/>
-              <a:t>PvD</a:t>
-            </a:r>
-            <a:r>
-              <a:rPr lang="en-US" sz="1800" dirty="0" smtClean="0"/>
-              <a:t> ID can be used to remove </a:t>
-            </a:r>
-            <a:r>
-              <a:rPr lang="en-US" sz="1800" dirty="0" err="1" smtClean="0"/>
-              <a:t>PvD</a:t>
-            </a:r>
-            <a:r>
-              <a:rPr lang="en-US" sz="1800" dirty="0" smtClean="0"/>
-              <a:t> information when </a:t>
-            </a:r>
-            <a:r>
-              <a:rPr lang="en-US" sz="1800" dirty="0" err="1" smtClean="0"/>
-              <a:t>PvD</a:t>
-            </a:r>
-            <a:r>
-              <a:rPr lang="en-US" sz="1800" dirty="0" smtClean="0"/>
-              <a:t> is expired/removed/..</a:t>
-            </a:r>
-          </a:p>
-          <a:p>
-            <a:pPr lvl="1"/>
-            <a:r>
-              <a:rPr lang="en-US" sz="2000" dirty="0" smtClean="0"/>
-              <a:t>Bootstrap </a:t>
-            </a:r>
-            <a:r>
-              <a:rPr lang="en-US" sz="2000" dirty="0" err="1" smtClean="0"/>
-              <a:t>PvD</a:t>
-            </a:r>
-            <a:r>
-              <a:rPr lang="en-US" sz="2000" dirty="0" smtClean="0"/>
-              <a:t> may contain an URL to additional </a:t>
-            </a:r>
-            <a:r>
-              <a:rPr lang="en-US" sz="2000" dirty="0" err="1" smtClean="0"/>
-              <a:t>PvD</a:t>
-            </a:r>
-            <a:r>
-              <a:rPr lang="en-US" sz="2000" dirty="0" smtClean="0"/>
-              <a:t> information</a:t>
-            </a:r>
-          </a:p>
-          <a:p>
-            <a:r>
-              <a:rPr lang="en-US" sz="2400" dirty="0" err="1" smtClean="0"/>
-              <a:t>PvD</a:t>
-            </a:r>
-            <a:r>
-              <a:rPr lang="en-US" sz="2400" dirty="0" smtClean="0"/>
-              <a:t> obtained by IPv6 could be linked to IPv4</a:t>
-            </a:r>
-          </a:p>
-          <a:p>
-            <a:pPr lvl="1"/>
-            <a:r>
-              <a:rPr lang="en-US" sz="2000" dirty="0" smtClean="0"/>
-              <a:t>IPv4 prefix included in </a:t>
-            </a:r>
-            <a:r>
-              <a:rPr lang="en-US" sz="2000" dirty="0" err="1" smtClean="0"/>
-              <a:t>PvD</a:t>
-            </a:r>
-            <a:endParaRPr lang="en-US" sz="2000" dirty="0" smtClean="0"/>
-          </a:p>
-          <a:p>
-            <a:pPr lvl="1"/>
-            <a:r>
-              <a:rPr lang="en-US" sz="2000" dirty="0" smtClean="0"/>
-              <a:t>Link via the source MAC address of the RA w/ DHCPv4 message</a:t>
-            </a:r>
-          </a:p>
-          <a:p>
-            <a:pPr lvl="1"/>
-            <a:r>
-              <a:rPr lang="en-US" sz="2000" dirty="0" smtClean="0"/>
-              <a:t>Interface ID (such as 3GPP link)</a:t>
-            </a:r>
-          </a:p>
-          <a:p>
-            <a:pPr lvl="1"/>
-            <a:r>
-              <a:rPr lang="en-US" sz="2000" dirty="0" smtClean="0"/>
-              <a:t>DNS search list of DHCPv4 and IPv6 </a:t>
-            </a:r>
-            <a:r>
-              <a:rPr lang="en-US" sz="2000" dirty="0" err="1" smtClean="0"/>
-              <a:t>PvD</a:t>
-            </a:r>
-            <a:endParaRPr lang="en-US" sz="2000" dirty="0" smtClean="0"/>
-          </a:p>
-        </p:txBody>
-      </p:sp>
-      <p:sp>
-        <p:nvSpPr>
-          <p:cNvPr id="3" name="Title 2"/>
-          <p:cNvSpPr>
-            <a:spLocks noGrp="1"/>
-          </p:cNvSpPr>
-          <p:nvPr>
-            <p:ph type="title"/>
-          </p:nvPr>
-        </p:nvSpPr>
-        <p:spPr/>
-        <p:txBody>
-          <a:bodyPr/>
-          <a:lstStyle/>
-          <a:p>
-            <a:r>
-              <a:rPr lang="en-US" dirty="0" smtClean="0"/>
-              <a:t>How ?</a:t>
-            </a:r>
-            <a:endParaRPr lang="en-US" dirty="0"/>
-          </a:p>
-        </p:txBody>
-      </p:sp>
-    </p:spTree>
-    <p:extLst>
-      <p:ext uri="{BB962C8B-B14F-4D97-AF65-F5344CB8AC3E}">
-        <p14:creationId xmlns:p14="http://schemas.microsoft.com/office/powerpoint/2010/main" val="821085756"/>
-      </p:ext>
-    </p:extLst>
-  </p:cSld>
-  <p:clrMapOvr>
-    <a:masterClrMapping/>
-  </p:clrMapOvr>
-  <p:transition spd="med">
-    <p:fade/>
-  </p:transition>
-</p:sld>
-</file>
-
-<file path=ppt/slides/slide5.xml><?xml version="1.0" encoding="utf-8"?>
 <p:sld xmlns:a="http://schemas.openxmlformats.org/drawingml/2006/main" xmlns:r="http://schemas.openxmlformats.org/officeDocument/2006/relationships" xmlns:p="http://schemas.openxmlformats.org/presentationml/2006/main" showMasterSp="0">
   <p:cSld>
     <p:spTree>
@@ -6110,15 +5911,7 @@
                   <a:schemeClr val="bg2"/>
                 </a:solidFill>
               </a:rPr>
-              <a:t>A New, Evolutive API and Transport-Layer Architecture for the </a:t>
-            </a:r>
-            <a:r>
-              <a:rPr lang="fr-FR" dirty="0">
-                <a:solidFill>
-                  <a:schemeClr val="bg2"/>
-                </a:solidFill>
-              </a:rPr>
-              <a:t>Internet:        </a:t>
+              <a:t>A New, Evolutive API and Transport-Layer Architecture for the Internet:        </a:t>
             </a:r>
             <a:r>
               <a:rPr lang="fr-FR" dirty="0">
@@ -6127,16 +5920,7 @@
                 </a:solidFill>
                 <a:hlinkClick r:id="rId4"/>
               </a:rPr>
-              <a:t>https://www.neat-project.org</a:t>
-            </a:r>
-            <a:r>
-              <a:rPr lang="fr-FR" dirty="0">
-                <a:solidFill>
-                  <a:schemeClr val="bg2"/>
-                </a:solidFill>
-                <a:hlinkClick r:id="rId4"/>
-              </a:rPr>
-              <a:t>/</a:t>
+              <a:t>https://www.neat-project.org/</a:t>
             </a:r>
             <a:endParaRPr lang="fr-FR" dirty="0">
               <a:solidFill>
@@ -6178,8 +5962,13 @@
             </a:pPr>
             <a:r>
               <a:rPr lang="en-US" dirty="0" smtClean="0"/>
-              <a:t>European H-2020 project - 7M€</a:t>
-            </a:r>
+              <a:t>European H-2020 </a:t>
+            </a:r>
+            <a:r>
+              <a:rPr lang="en-US" dirty="0" smtClean="0"/>
+              <a:t>project</a:t>
+            </a:r>
+            <a:endParaRPr lang="en-US" dirty="0" smtClean="0"/>
           </a:p>
           <a:p>
             <a:pPr>
@@ -6256,10 +6045,14 @@
               <a:t> </a:t>
             </a:r>
             <a:r>
-              <a:rPr lang="en-US" sz="1600" dirty="0">
+              <a:rPr lang="en-US" sz="1600" dirty="0" smtClean="0">
                 <a:hlinkClick r:id="rId5"/>
               </a:rPr>
               <a:t>draft-stenberg-mif-mpvd-dns-00</a:t>
+            </a:r>
+            <a:r>
+              <a:rPr lang="en-US" sz="1600" dirty="0" smtClean="0"/>
+              <a:t> (old)</a:t>
             </a:r>
             <a:endParaRPr lang="en-US" sz="1600" dirty="0"/>
           </a:p>
@@ -6274,23 +6067,13 @@
             </a:pPr>
             <a:r>
               <a:rPr lang="en-US" sz="1600" dirty="0"/>
-              <a:t>Integration to </a:t>
-            </a:r>
-            <a:r>
-              <a:rPr lang="en-US" sz="1600" dirty="0"/>
-              <a:t>NEAT code: </a:t>
+              <a:t>Integration to NEAT code: </a:t>
             </a:r>
             <a:r>
               <a:rPr lang="en-US" sz="1600" dirty="0">
                 <a:hlinkClick r:id="rId6"/>
               </a:rPr>
-              <a:t>https://</a:t>
-            </a:r>
-            <a:r>
-              <a:rPr lang="en-US" sz="1600" dirty="0">
-                <a:hlinkClick r:id="rId6"/>
-              </a:rPr>
-              <a:t>github.com/NEAT-project/neat/pull/80</a:t>
+              <a:t>https://github.com/NEAT-project/neat/pull/80</a:t>
             </a:r>
             <a:endParaRPr lang="en-US" sz="1600" dirty="0"/>
           </a:p>
@@ -6333,8 +6116,8 @@
         </p:nvSpPr>
         <p:spPr>
           <a:xfrm>
-            <a:off x="423180" y="5117011"/>
-            <a:ext cx="4339001" cy="560666"/>
+            <a:off x="574668" y="4923112"/>
+            <a:ext cx="4339001" cy="750975"/>
           </a:xfrm>
           <a:prstGeom prst="rect">
             <a:avLst/>
@@ -6365,7 +6148,23 @@
                   <a:schemeClr val="bg1"/>
                 </a:solidFill>
               </a:rPr>
-              <a:t>Wednesday, June 29: </a:t>
+              <a:t>Wednesday, </a:t>
+            </a:r>
+            <a:r>
+              <a:rPr lang="en-US" sz="1400" b="1">
+                <a:solidFill>
+                  <a:schemeClr val="bg1"/>
+                </a:solidFill>
+              </a:rPr>
+              <a:t>June </a:t>
+            </a:r>
+            <a:r>
+              <a:rPr lang="en-US" sz="1400" b="1" smtClean="0">
+                <a:solidFill>
+                  <a:schemeClr val="bg1"/>
+                </a:solidFill>
+              </a:rPr>
+              <a:t>29 2016: </a:t>
             </a:r>
             <a:r>
               <a:rPr lang="en-US" sz="1400" b="1" dirty="0">
@@ -6373,23 +6172,7 @@
                   <a:schemeClr val="bg1"/>
                 </a:solidFill>
               </a:rPr>
-              <a:t>plenary </a:t>
-            </a:r>
-            <a:r>
-              <a:rPr lang="en-US" sz="1400" b="1" dirty="0">
-                <a:solidFill>
-                  <a:schemeClr val="bg1"/>
-                </a:solidFill>
-              </a:rPr>
-              <a:t>session in </a:t>
-            </a:r>
-            <a:r>
-              <a:rPr lang="en-US" sz="1400" b="1" dirty="0">
-                <a:solidFill>
-                  <a:schemeClr val="bg1"/>
-                </a:solidFill>
-              </a:rPr>
-              <a:t>Oslo</a:t>
+              <a:t>plenary session in Oslo</a:t>
             </a:r>
           </a:p>
           <a:p>
@@ -6455,7 +6238,7 @@
         </p:blipFill>
         <p:spPr>
           <a:xfrm>
-            <a:off x="5289300" y="2790760"/>
+            <a:off x="5312617" y="3127519"/>
             <a:ext cx="3821075" cy="3071754"/>
           </a:xfrm>
           <a:prstGeom prst="rect">
@@ -6614,6 +6397,1227 @@
     <p:tnLst>
       <p:par>
         <p:cTn id="1" dur="indefinite" restart="never" nodeType="tmRoot"/>
+      </p:par>
+    </p:tnLst>
+  </p:timing>
+</p:sld>
+</file>
+
+<file path=ppt/slides/slide5.xml><?xml version="1.0" encoding="utf-8"?>
+<p:sld xmlns:a="http://schemas.openxmlformats.org/drawingml/2006/main" xmlns:r="http://schemas.openxmlformats.org/officeDocument/2006/relationships" xmlns:p="http://schemas.openxmlformats.org/presentationml/2006/main">
+  <p:cSld>
+    <p:spTree>
+      <p:nvGrpSpPr>
+        <p:cNvPr id="1" name=""/>
+        <p:cNvGrpSpPr/>
+        <p:nvPr/>
+      </p:nvGrpSpPr>
+      <p:grpSpPr>
+        <a:xfrm>
+          <a:off x="0" y="0"/>
+          <a:ext cx="0" cy="0"/>
+          <a:chOff x="0" y="0"/>
+          <a:chExt cx="0" cy="0"/>
+        </a:xfrm>
+      </p:grpSpPr>
+      <p:sp>
+        <p:nvSpPr>
+          <p:cNvPr id="2" name="Text Placeholder 1"/>
+          <p:cNvSpPr>
+            <a:spLocks noGrp="1"/>
+          </p:cNvSpPr>
+          <p:nvPr>
+            <p:ph type="body" sz="quarter" idx="10"/>
+          </p:nvPr>
+        </p:nvSpPr>
+        <p:spPr/>
+        <p:txBody>
+          <a:bodyPr/>
+          <a:lstStyle/>
+          <a:p>
+            <a:r>
+              <a:rPr lang="en-US" sz="2400" dirty="0" smtClean="0"/>
+              <a:t>Bootstrap </a:t>
+            </a:r>
+            <a:r>
+              <a:rPr lang="en-US" sz="2400" dirty="0" err="1" smtClean="0"/>
+              <a:t>PvD</a:t>
+            </a:r>
+            <a:r>
+              <a:rPr lang="en-US" sz="2400" dirty="0" smtClean="0"/>
+              <a:t> information added to IPv6 Router Advertisement</a:t>
+            </a:r>
+          </a:p>
+          <a:p>
+            <a:pPr lvl="1"/>
+            <a:r>
+              <a:rPr lang="en-US" sz="2000" dirty="0" err="1" smtClean="0"/>
+              <a:t>PvD</a:t>
+            </a:r>
+            <a:r>
+              <a:rPr lang="en-US" sz="2000" dirty="0" smtClean="0"/>
+              <a:t> applies to all Prefix Information Options (PIO)</a:t>
+            </a:r>
+          </a:p>
+          <a:p>
+            <a:pPr lvl="2"/>
+            <a:r>
+              <a:rPr lang="en-US" sz="1800" dirty="0" smtClean="0"/>
+              <a:t>Use multiple RA if the </a:t>
+            </a:r>
+            <a:r>
+              <a:rPr lang="en-US" sz="1800" dirty="0" err="1" smtClean="0"/>
+              <a:t>PvD</a:t>
+            </a:r>
+            <a:r>
+              <a:rPr lang="en-US" sz="1800" dirty="0" smtClean="0"/>
+              <a:t> is not to be shared among PIO</a:t>
+            </a:r>
+          </a:p>
+          <a:p>
+            <a:pPr lvl="1"/>
+            <a:r>
+              <a:rPr lang="en-US" sz="2000" dirty="0" smtClean="0"/>
+              <a:t>Bootstrap </a:t>
+            </a:r>
+            <a:r>
+              <a:rPr lang="en-US" sz="2000" dirty="0" err="1" smtClean="0"/>
+              <a:t>PvD</a:t>
+            </a:r>
+            <a:r>
+              <a:rPr lang="en-US" sz="2000" dirty="0" smtClean="0"/>
+              <a:t> ID </a:t>
+            </a:r>
+            <a:r>
+              <a:rPr lang="en-US" sz="2000" dirty="0" smtClean="0"/>
+              <a:t>may </a:t>
+            </a:r>
+            <a:r>
+              <a:rPr lang="en-US" sz="2000" dirty="0" smtClean="0"/>
+              <a:t>be used </a:t>
+            </a:r>
+            <a:r>
+              <a:rPr lang="en-US" sz="2000" smtClean="0"/>
+              <a:t>to retrieve additional </a:t>
+            </a:r>
+            <a:r>
+              <a:rPr lang="en-US" sz="2000" dirty="0" err="1" smtClean="0"/>
+              <a:t>PvD</a:t>
+            </a:r>
+            <a:r>
+              <a:rPr lang="en-US" sz="2000" dirty="0" smtClean="0"/>
+              <a:t> information</a:t>
+            </a:r>
+          </a:p>
+          <a:p>
+            <a:r>
+              <a:rPr lang="en-US" sz="2400" dirty="0" err="1" smtClean="0"/>
+              <a:t>PvD</a:t>
+            </a:r>
+            <a:r>
+              <a:rPr lang="en-US" sz="2400" dirty="0" smtClean="0"/>
+              <a:t> obtained by IPv6 could be linked to IPv4</a:t>
+            </a:r>
+          </a:p>
+          <a:p>
+            <a:pPr lvl="1"/>
+            <a:r>
+              <a:rPr lang="en-US" sz="2000" dirty="0" smtClean="0"/>
+              <a:t>IPv4 prefix included in </a:t>
+            </a:r>
+            <a:r>
+              <a:rPr lang="en-US" sz="2000" dirty="0" err="1" smtClean="0"/>
+              <a:t>PvD</a:t>
+            </a:r>
+            <a:endParaRPr lang="en-US" sz="2000" dirty="0" smtClean="0"/>
+          </a:p>
+          <a:p>
+            <a:pPr lvl="1"/>
+            <a:r>
+              <a:rPr lang="en-US" sz="2000" dirty="0" smtClean="0"/>
+              <a:t>Link via the source MAC address of the RA w/ DHCPv4 message</a:t>
+            </a:r>
+          </a:p>
+          <a:p>
+            <a:pPr lvl="1"/>
+            <a:r>
+              <a:rPr lang="en-US" sz="2000" dirty="0" smtClean="0"/>
+              <a:t>Interface ID (such as 3GPP link)</a:t>
+            </a:r>
+          </a:p>
+          <a:p>
+            <a:pPr lvl="1"/>
+            <a:r>
+              <a:rPr lang="en-US" sz="2000" dirty="0" smtClean="0"/>
+              <a:t>DNS search list of DHCPv4 and IPv6 </a:t>
+            </a:r>
+            <a:r>
+              <a:rPr lang="en-US" sz="2000" dirty="0" err="1" smtClean="0"/>
+              <a:t>PvD</a:t>
+            </a:r>
+            <a:endParaRPr lang="en-US" sz="2000" dirty="0" smtClean="0"/>
+          </a:p>
+        </p:txBody>
+      </p:sp>
+      <p:sp>
+        <p:nvSpPr>
+          <p:cNvPr id="3" name="Title 2"/>
+          <p:cNvSpPr>
+            <a:spLocks noGrp="1"/>
+          </p:cNvSpPr>
+          <p:nvPr>
+            <p:ph type="title"/>
+          </p:nvPr>
+        </p:nvSpPr>
+        <p:spPr/>
+        <p:txBody>
+          <a:bodyPr/>
+          <a:lstStyle/>
+          <a:p>
+            <a:r>
+              <a:rPr lang="en-US" dirty="0" smtClean="0"/>
+              <a:t>How ?</a:t>
+            </a:r>
+            <a:endParaRPr lang="en-US" dirty="0"/>
+          </a:p>
+        </p:txBody>
+      </p:sp>
+    </p:spTree>
+    <p:extLst>
+      <p:ext uri="{BB962C8B-B14F-4D97-AF65-F5344CB8AC3E}">
+        <p14:creationId xmlns:p14="http://schemas.microsoft.com/office/powerpoint/2010/main" val="821085756"/>
+      </p:ext>
+    </p:extLst>
+  </p:cSld>
+  <p:clrMapOvr>
+    <a:masterClrMapping/>
+  </p:clrMapOvr>
+  <p:transition spd="med">
+    <p:fade/>
+  </p:transition>
+  <p:timing>
+    <p:tnLst>
+      <p:par>
+        <p:cTn id="1" dur="indefinite" restart="never" nodeType="tmRoot">
+          <p:childTnLst>
+            <p:seq concurrent="1" nextAc="seek">
+              <p:cTn id="2" dur="indefinite" nodeType="mainSeq">
+                <p:childTnLst>
+                  <p:par>
+                    <p:cTn id="3" fill="hold">
+                      <p:stCondLst>
+                        <p:cond delay="indefinite"/>
+                      </p:stCondLst>
+                      <p:childTnLst>
+                        <p:par>
+                          <p:cTn id="4" fill="hold">
+                            <p:stCondLst>
+                              <p:cond delay="0"/>
+                            </p:stCondLst>
+                            <p:childTnLst>
+                              <p:par>
+                                <p:cTn id="5" presetID="1" presetClass="entr" presetSubtype="0" fill="hold" grpId="0" nodeType="clickEffect">
+                                  <p:stCondLst>
+                                    <p:cond delay="0"/>
+                                  </p:stCondLst>
+                                  <p:childTnLst>
+                                    <p:set>
+                                      <p:cBhvr>
+                                        <p:cTn id="6" dur="1" fill="hold">
+                                          <p:stCondLst>
+                                            <p:cond delay="0"/>
+                                          </p:stCondLst>
+                                        </p:cTn>
+                                        <p:tgtEl>
+                                          <p:spTgt spid="2">
+                                            <p:txEl>
+                                              <p:pRg st="0" end="0"/>
+                                            </p:txEl>
+                                          </p:spTgt>
+                                        </p:tgtEl>
+                                        <p:attrNameLst>
+                                          <p:attrName>style.visibility</p:attrName>
+                                        </p:attrNameLst>
+                                      </p:cBhvr>
+                                      <p:to>
+                                        <p:strVal val="visible"/>
+                                      </p:to>
+                                    </p:set>
+                                  </p:childTnLst>
+                                </p:cTn>
+                              </p:par>
+                              <p:par>
+                                <p:cTn id="7" presetID="1" presetClass="entr" presetSubtype="0" fill="hold" grpId="0" nodeType="withEffect">
+                                  <p:stCondLst>
+                                    <p:cond delay="0"/>
+                                  </p:stCondLst>
+                                  <p:childTnLst>
+                                    <p:set>
+                                      <p:cBhvr>
+                                        <p:cTn id="8" dur="1" fill="hold">
+                                          <p:stCondLst>
+                                            <p:cond delay="0"/>
+                                          </p:stCondLst>
+                                        </p:cTn>
+                                        <p:tgtEl>
+                                          <p:spTgt spid="2">
+                                            <p:txEl>
+                                              <p:pRg st="1" end="1"/>
+                                            </p:txEl>
+                                          </p:spTgt>
+                                        </p:tgtEl>
+                                        <p:attrNameLst>
+                                          <p:attrName>style.visibility</p:attrName>
+                                        </p:attrNameLst>
+                                      </p:cBhvr>
+                                      <p:to>
+                                        <p:strVal val="visible"/>
+                                      </p:to>
+                                    </p:set>
+                                  </p:childTnLst>
+                                </p:cTn>
+                              </p:par>
+                              <p:par>
+                                <p:cTn id="9" presetID="1" presetClass="entr" presetSubtype="0" fill="hold" grpId="0" nodeType="withEffect">
+                                  <p:stCondLst>
+                                    <p:cond delay="0"/>
+                                  </p:stCondLst>
+                                  <p:childTnLst>
+                                    <p:set>
+                                      <p:cBhvr>
+                                        <p:cTn id="10" dur="1" fill="hold">
+                                          <p:stCondLst>
+                                            <p:cond delay="0"/>
+                                          </p:stCondLst>
+                                        </p:cTn>
+                                        <p:tgtEl>
+                                          <p:spTgt spid="2">
+                                            <p:txEl>
+                                              <p:pRg st="2" end="2"/>
+                                            </p:txEl>
+                                          </p:spTgt>
+                                        </p:tgtEl>
+                                        <p:attrNameLst>
+                                          <p:attrName>style.visibility</p:attrName>
+                                        </p:attrNameLst>
+                                      </p:cBhvr>
+                                      <p:to>
+                                        <p:strVal val="visible"/>
+                                      </p:to>
+                                    </p:set>
+                                  </p:childTnLst>
+                                </p:cTn>
+                              </p:par>
+                              <p:par>
+                                <p:cTn id="11" presetID="1" presetClass="entr" presetSubtype="0" fill="hold" grpId="0" nodeType="withEffect">
+                                  <p:stCondLst>
+                                    <p:cond delay="0"/>
+                                  </p:stCondLst>
+                                  <p:childTnLst>
+                                    <p:set>
+                                      <p:cBhvr>
+                                        <p:cTn id="12" dur="1" fill="hold">
+                                          <p:stCondLst>
+                                            <p:cond delay="0"/>
+                                          </p:stCondLst>
+                                        </p:cTn>
+                                        <p:tgtEl>
+                                          <p:spTgt spid="2">
+                                            <p:txEl>
+                                              <p:pRg st="3" end="3"/>
+                                            </p:txEl>
+                                          </p:spTgt>
+                                        </p:tgtEl>
+                                        <p:attrNameLst>
+                                          <p:attrName>style.visibility</p:attrName>
+                                        </p:attrNameLst>
+                                      </p:cBhvr>
+                                      <p:to>
+                                        <p:strVal val="visible"/>
+                                      </p:to>
+                                    </p:set>
+                                  </p:childTnLst>
+                                </p:cTn>
+                              </p:par>
+                            </p:childTnLst>
+                          </p:cTn>
+                        </p:par>
+                      </p:childTnLst>
+                    </p:cTn>
+                  </p:par>
+                  <p:par>
+                    <p:cTn id="13" fill="hold">
+                      <p:stCondLst>
+                        <p:cond delay="indefinite"/>
+                      </p:stCondLst>
+                      <p:childTnLst>
+                        <p:par>
+                          <p:cTn id="14" fill="hold">
+                            <p:stCondLst>
+                              <p:cond delay="0"/>
+                            </p:stCondLst>
+                            <p:childTnLst>
+                              <p:par>
+                                <p:cTn id="15" presetID="1" presetClass="entr" presetSubtype="0" fill="hold" grpId="0" nodeType="clickEffect">
+                                  <p:stCondLst>
+                                    <p:cond delay="0"/>
+                                  </p:stCondLst>
+                                  <p:childTnLst>
+                                    <p:set>
+                                      <p:cBhvr>
+                                        <p:cTn id="16" dur="1" fill="hold">
+                                          <p:stCondLst>
+                                            <p:cond delay="0"/>
+                                          </p:stCondLst>
+                                        </p:cTn>
+                                        <p:tgtEl>
+                                          <p:spTgt spid="2">
+                                            <p:txEl>
+                                              <p:pRg st="4" end="4"/>
+                                            </p:txEl>
+                                          </p:spTgt>
+                                        </p:tgtEl>
+                                        <p:attrNameLst>
+                                          <p:attrName>style.visibility</p:attrName>
+                                        </p:attrNameLst>
+                                      </p:cBhvr>
+                                      <p:to>
+                                        <p:strVal val="visible"/>
+                                      </p:to>
+                                    </p:set>
+                                  </p:childTnLst>
+                                </p:cTn>
+                              </p:par>
+                              <p:par>
+                                <p:cTn id="17" presetID="1" presetClass="entr" presetSubtype="0" fill="hold" grpId="0" nodeType="withEffect">
+                                  <p:stCondLst>
+                                    <p:cond delay="0"/>
+                                  </p:stCondLst>
+                                  <p:childTnLst>
+                                    <p:set>
+                                      <p:cBhvr>
+                                        <p:cTn id="18" dur="1" fill="hold">
+                                          <p:stCondLst>
+                                            <p:cond delay="0"/>
+                                          </p:stCondLst>
+                                        </p:cTn>
+                                        <p:tgtEl>
+                                          <p:spTgt spid="2">
+                                            <p:txEl>
+                                              <p:pRg st="5" end="5"/>
+                                            </p:txEl>
+                                          </p:spTgt>
+                                        </p:tgtEl>
+                                        <p:attrNameLst>
+                                          <p:attrName>style.visibility</p:attrName>
+                                        </p:attrNameLst>
+                                      </p:cBhvr>
+                                      <p:to>
+                                        <p:strVal val="visible"/>
+                                      </p:to>
+                                    </p:set>
+                                  </p:childTnLst>
+                                </p:cTn>
+                              </p:par>
+                              <p:par>
+                                <p:cTn id="19" presetID="1" presetClass="entr" presetSubtype="0" fill="hold" grpId="0" nodeType="withEffect">
+                                  <p:stCondLst>
+                                    <p:cond delay="0"/>
+                                  </p:stCondLst>
+                                  <p:childTnLst>
+                                    <p:set>
+                                      <p:cBhvr>
+                                        <p:cTn id="20" dur="1" fill="hold">
+                                          <p:stCondLst>
+                                            <p:cond delay="0"/>
+                                          </p:stCondLst>
+                                        </p:cTn>
+                                        <p:tgtEl>
+                                          <p:spTgt spid="2">
+                                            <p:txEl>
+                                              <p:pRg st="6" end="6"/>
+                                            </p:txEl>
+                                          </p:spTgt>
+                                        </p:tgtEl>
+                                        <p:attrNameLst>
+                                          <p:attrName>style.visibility</p:attrName>
+                                        </p:attrNameLst>
+                                      </p:cBhvr>
+                                      <p:to>
+                                        <p:strVal val="visible"/>
+                                      </p:to>
+                                    </p:set>
+                                  </p:childTnLst>
+                                </p:cTn>
+                              </p:par>
+                              <p:par>
+                                <p:cTn id="21" presetID="1" presetClass="entr" presetSubtype="0" fill="hold" grpId="0" nodeType="withEffect">
+                                  <p:stCondLst>
+                                    <p:cond delay="0"/>
+                                  </p:stCondLst>
+                                  <p:childTnLst>
+                                    <p:set>
+                                      <p:cBhvr>
+                                        <p:cTn id="22" dur="1" fill="hold">
+                                          <p:stCondLst>
+                                            <p:cond delay="0"/>
+                                          </p:stCondLst>
+                                        </p:cTn>
+                                        <p:tgtEl>
+                                          <p:spTgt spid="2">
+                                            <p:txEl>
+                                              <p:pRg st="7" end="7"/>
+                                            </p:txEl>
+                                          </p:spTgt>
+                                        </p:tgtEl>
+                                        <p:attrNameLst>
+                                          <p:attrName>style.visibility</p:attrName>
+                                        </p:attrNameLst>
+                                      </p:cBhvr>
+                                      <p:to>
+                                        <p:strVal val="visible"/>
+                                      </p:to>
+                                    </p:set>
+                                  </p:childTnLst>
+                                </p:cTn>
+                              </p:par>
+                              <p:par>
+                                <p:cTn id="23" presetID="1" presetClass="entr" presetSubtype="0" fill="hold" grpId="0" nodeType="withEffect">
+                                  <p:stCondLst>
+                                    <p:cond delay="0"/>
+                                  </p:stCondLst>
+                                  <p:childTnLst>
+                                    <p:set>
+                                      <p:cBhvr>
+                                        <p:cTn id="24" dur="1" fill="hold">
+                                          <p:stCondLst>
+                                            <p:cond delay="0"/>
+                                          </p:stCondLst>
+                                        </p:cTn>
+                                        <p:tgtEl>
+                                          <p:spTgt spid="2">
+                                            <p:txEl>
+                                              <p:pRg st="8" end="8"/>
+                                            </p:txEl>
+                                          </p:spTgt>
+                                        </p:tgtEl>
+                                        <p:attrNameLst>
+                                          <p:attrName>style.visibility</p:attrName>
+                                        </p:attrNameLst>
+                                      </p:cBhvr>
+                                      <p:to>
+                                        <p:strVal val="visible"/>
+                                      </p:to>
+                                    </p:set>
+                                  </p:childTnLst>
+                                </p:cTn>
+                              </p:par>
+                            </p:childTnLst>
+                          </p:cTn>
+                        </p:par>
+                      </p:childTnLst>
+                    </p:cTn>
+                  </p:par>
+                </p:childTnLst>
+              </p:cTn>
+              <p:prevCondLst>
+                <p:cond evt="onPrev" delay="0">
+                  <p:tgtEl>
+                    <p:sldTgt/>
+                  </p:tgtEl>
+                </p:cond>
+              </p:prevCondLst>
+              <p:nextCondLst>
+                <p:cond evt="onNext" delay="0">
+                  <p:tgtEl>
+                    <p:sldTgt/>
+                  </p:tgtEl>
+                </p:cond>
+              </p:nextCondLst>
+            </p:seq>
+          </p:childTnLst>
+        </p:cTn>
+      </p:par>
+    </p:tnLst>
+    <p:bldLst>
+      <p:bldP spid="2" grpId="0" build="p"/>
+    </p:bldLst>
+  </p:timing>
+</p:sld>
+</file>
+
+<file path=ppt/slides/slide6.xml><?xml version="1.0" encoding="utf-8"?>
+<p:sld xmlns:a="http://schemas.openxmlformats.org/drawingml/2006/main" xmlns:r="http://schemas.openxmlformats.org/officeDocument/2006/relationships" xmlns:p="http://schemas.openxmlformats.org/presentationml/2006/main">
+  <p:cSld>
+    <p:spTree>
+      <p:nvGrpSpPr>
+        <p:cNvPr id="1" name=""/>
+        <p:cNvGrpSpPr/>
+        <p:nvPr/>
+      </p:nvGrpSpPr>
+      <p:grpSpPr>
+        <a:xfrm>
+          <a:off x="0" y="0"/>
+          <a:ext cx="0" cy="0"/>
+          <a:chOff x="0" y="0"/>
+          <a:chExt cx="0" cy="0"/>
+        </a:xfrm>
+      </p:grpSpPr>
+      <p:sp>
+        <p:nvSpPr>
+          <p:cNvPr id="10" name="Title 9"/>
+          <p:cNvSpPr>
+            <a:spLocks noGrp="1"/>
+          </p:cNvSpPr>
+          <p:nvPr>
+            <p:ph type="title"/>
+          </p:nvPr>
+        </p:nvSpPr>
+        <p:spPr>
+          <a:xfrm>
+            <a:off x="467544" y="389087"/>
+            <a:ext cx="6858000" cy="1295400"/>
+          </a:xfrm>
+        </p:spPr>
+        <p:txBody>
+          <a:bodyPr/>
+          <a:lstStyle/>
+          <a:p>
+            <a:r>
+              <a:rPr lang="en-US" sz="3200" dirty="0" smtClean="0"/>
+              <a:t>IPv6 Content Networking</a:t>
+            </a:r>
+            <a:br>
+              <a:rPr lang="en-US" sz="3200" dirty="0" smtClean="0"/>
+            </a:br>
+            <a:r>
+              <a:rPr lang="en-US" sz="3200" dirty="0" smtClean="0"/>
+              <a:t>IETF Glass to Glass Internet Ecosystem (GGIE)</a:t>
+            </a:r>
+            <a:endParaRPr lang="en-US" sz="3200" dirty="0"/>
+          </a:p>
+        </p:txBody>
+      </p:sp>
+      <p:sp>
+        <p:nvSpPr>
+          <p:cNvPr id="2" name="Slide Number Placeholder 1"/>
+          <p:cNvSpPr>
+            <a:spLocks noGrp="1"/>
+          </p:cNvSpPr>
+          <p:nvPr>
+            <p:ph type="sldNum" sz="quarter" idx="12"/>
+          </p:nvPr>
+        </p:nvSpPr>
+        <p:spPr/>
+        <p:txBody>
+          <a:bodyPr/>
+          <a:lstStyle/>
+          <a:p>
+            <a:pPr>
+              <a:defRPr/>
+            </a:pPr>
+            <a:fld id="{F8B3DF7F-79A8-4799-80FE-74691D35D4FF}" type="slidenum">
+              <a:rPr lang="en-US" altLang="en-US" smtClean="0"/>
+              <a:pPr>
+                <a:defRPr/>
+              </a:pPr>
+              <a:t>6</a:t>
+            </a:fld>
+            <a:endParaRPr lang="en-US" altLang="en-US"/>
+          </a:p>
+        </p:txBody>
+      </p:sp>
+      <p:sp>
+        <p:nvSpPr>
+          <p:cNvPr id="3" name="TextBox 2"/>
+          <p:cNvSpPr txBox="1"/>
+          <p:nvPr/>
+        </p:nvSpPr>
+        <p:spPr>
+          <a:xfrm>
+            <a:off x="971600" y="2175811"/>
+            <a:ext cx="1103187" cy="923330"/>
+          </a:xfrm>
+          <a:prstGeom prst="rect">
+            <a:avLst/>
+          </a:prstGeom>
+        </p:spPr>
+        <p:style>
+          <a:lnRef idx="2">
+            <a:schemeClr val="accent1"/>
+          </a:lnRef>
+          <a:fillRef idx="1">
+            <a:schemeClr val="lt1"/>
+          </a:fillRef>
+          <a:effectRef idx="0">
+            <a:schemeClr val="accent1"/>
+          </a:effectRef>
+          <a:fontRef idx="minor">
+            <a:schemeClr val="dk1"/>
+          </a:fontRef>
+        </p:style>
+        <p:txBody>
+          <a:bodyPr wrap="none" rtlCol="0">
+            <a:spAutoFit/>
+          </a:bodyPr>
+          <a:lstStyle/>
+          <a:p>
+            <a:r>
+              <a:rPr lang="en-US" dirty="0" smtClean="0"/>
+              <a:t>Client A</a:t>
+            </a:r>
+          </a:p>
+          <a:p>
+            <a:endParaRPr lang="en-US" dirty="0" smtClean="0"/>
+          </a:p>
+          <a:p>
+            <a:r>
+              <a:rPr lang="en-US" dirty="0" smtClean="0"/>
+              <a:t>&lt;IP</a:t>
+            </a:r>
+            <a:r>
+              <a:rPr lang="en-US" baseline="-25000" dirty="0" smtClean="0"/>
+              <a:t>CA</a:t>
+            </a:r>
+            <a:r>
+              <a:rPr lang="en-US" dirty="0" smtClean="0"/>
+              <a:t>, *&gt;</a:t>
+            </a:r>
+            <a:endParaRPr lang="en-US" dirty="0"/>
+          </a:p>
+        </p:txBody>
+      </p:sp>
+      <p:sp>
+        <p:nvSpPr>
+          <p:cNvPr id="4" name="TextBox 3"/>
+          <p:cNvSpPr txBox="1"/>
+          <p:nvPr/>
+        </p:nvSpPr>
+        <p:spPr>
+          <a:xfrm>
+            <a:off x="5526380" y="2060848"/>
+            <a:ext cx="1261884" cy="1754326"/>
+          </a:xfrm>
+          <a:prstGeom prst="rect">
+            <a:avLst/>
+          </a:prstGeom>
+        </p:spPr>
+        <p:style>
+          <a:lnRef idx="1">
+            <a:schemeClr val="accent1"/>
+          </a:lnRef>
+          <a:fillRef idx="2">
+            <a:schemeClr val="accent1"/>
+          </a:fillRef>
+          <a:effectRef idx="1">
+            <a:schemeClr val="accent1"/>
+          </a:effectRef>
+          <a:fontRef idx="minor">
+            <a:schemeClr val="dk1"/>
+          </a:fontRef>
+        </p:style>
+        <p:txBody>
+          <a:bodyPr wrap="none" rtlCol="0">
+            <a:spAutoFit/>
+          </a:bodyPr>
+          <a:lstStyle/>
+          <a:p>
+            <a:r>
+              <a:rPr lang="en-US" b="1" dirty="0" smtClean="0"/>
+              <a:t>Server</a:t>
+            </a:r>
+          </a:p>
+          <a:p>
+            <a:endParaRPr lang="en-US" dirty="0" smtClean="0"/>
+          </a:p>
+          <a:p>
+            <a:r>
+              <a:rPr lang="en-US" dirty="0" smtClean="0"/>
+              <a:t>&lt;IP</a:t>
+            </a:r>
+            <a:r>
+              <a:rPr lang="en-US" baseline="-25000" dirty="0" smtClean="0"/>
+              <a:t>SA</a:t>
+            </a:r>
+            <a:r>
+              <a:rPr lang="en-US" dirty="0" smtClean="0"/>
+              <a:t>, 80&gt;</a:t>
+            </a:r>
+          </a:p>
+          <a:p>
+            <a:r>
+              <a:rPr lang="en-US" dirty="0" smtClean="0"/>
+              <a:t>&lt;IP</a:t>
+            </a:r>
+            <a:r>
+              <a:rPr lang="en-US" baseline="-25000" dirty="0" smtClean="0"/>
+              <a:t>SB</a:t>
+            </a:r>
+            <a:r>
+              <a:rPr lang="en-US" dirty="0" smtClean="0"/>
+              <a:t>, 80&gt;</a:t>
+            </a:r>
+          </a:p>
+          <a:p>
+            <a:r>
+              <a:rPr lang="is-IS" dirty="0" smtClean="0"/>
+              <a:t>…</a:t>
+            </a:r>
+          </a:p>
+          <a:p>
+            <a:r>
+              <a:rPr lang="is-IS" dirty="0" smtClean="0"/>
+              <a:t>&lt;IP</a:t>
+            </a:r>
+            <a:r>
+              <a:rPr lang="is-IS" baseline="-25000" dirty="0" smtClean="0"/>
+              <a:t>SZ</a:t>
+            </a:r>
+            <a:r>
+              <a:rPr lang="is-IS" dirty="0" smtClean="0"/>
+              <a:t>, 80&gt;</a:t>
+            </a:r>
+            <a:endParaRPr lang="en-US" dirty="0"/>
+          </a:p>
+        </p:txBody>
+      </p:sp>
+      <p:sp>
+        <p:nvSpPr>
+          <p:cNvPr id="5" name="TextBox 4"/>
+          <p:cNvSpPr txBox="1"/>
+          <p:nvPr/>
+        </p:nvSpPr>
+        <p:spPr>
+          <a:xfrm>
+            <a:off x="1007541" y="3501008"/>
+            <a:ext cx="1095172" cy="923330"/>
+          </a:xfrm>
+          <a:prstGeom prst="rect">
+            <a:avLst/>
+          </a:prstGeom>
+        </p:spPr>
+        <p:style>
+          <a:lnRef idx="2">
+            <a:schemeClr val="accent1"/>
+          </a:lnRef>
+          <a:fillRef idx="1">
+            <a:schemeClr val="lt1"/>
+          </a:fillRef>
+          <a:effectRef idx="0">
+            <a:schemeClr val="accent1"/>
+          </a:effectRef>
+          <a:fontRef idx="minor">
+            <a:schemeClr val="dk1"/>
+          </a:fontRef>
+        </p:style>
+        <p:txBody>
+          <a:bodyPr wrap="none" rtlCol="0">
+            <a:spAutoFit/>
+          </a:bodyPr>
+          <a:lstStyle/>
+          <a:p>
+            <a:r>
+              <a:rPr lang="en-US" dirty="0" smtClean="0"/>
+              <a:t>Client A</a:t>
+            </a:r>
+          </a:p>
+          <a:p>
+            <a:endParaRPr lang="en-US" dirty="0" smtClean="0"/>
+          </a:p>
+          <a:p>
+            <a:r>
+              <a:rPr lang="en-US" dirty="0" smtClean="0"/>
+              <a:t>&lt;IP</a:t>
+            </a:r>
+            <a:r>
+              <a:rPr lang="en-US" baseline="-25000" dirty="0" smtClean="0"/>
+              <a:t>CZ</a:t>
+            </a:r>
+            <a:r>
+              <a:rPr lang="en-US" dirty="0" smtClean="0"/>
+              <a:t>, *&gt;</a:t>
+            </a:r>
+            <a:endParaRPr lang="en-US" dirty="0"/>
+          </a:p>
+        </p:txBody>
+      </p:sp>
+      <p:sp>
+        <p:nvSpPr>
+          <p:cNvPr id="11" name="TextBox 10"/>
+          <p:cNvSpPr txBox="1"/>
+          <p:nvPr/>
+        </p:nvSpPr>
+        <p:spPr>
+          <a:xfrm>
+            <a:off x="4601370" y="4055006"/>
+            <a:ext cx="2749471" cy="369332"/>
+          </a:xfrm>
+          <a:prstGeom prst="rect">
+            <a:avLst/>
+          </a:prstGeom>
+          <a:noFill/>
+        </p:spPr>
+        <p:txBody>
+          <a:bodyPr wrap="none" rtlCol="0">
+            <a:spAutoFit/>
+          </a:bodyPr>
+          <a:lstStyle/>
+          <a:p>
+            <a:r>
+              <a:rPr lang="en-US" smtClean="0"/>
+              <a:t>http://demo.6cn.solutions</a:t>
+            </a:r>
+            <a:endParaRPr lang="en-US"/>
+          </a:p>
+        </p:txBody>
+      </p:sp>
+      <p:grpSp>
+        <p:nvGrpSpPr>
+          <p:cNvPr id="17" name="Group 16"/>
+          <p:cNvGrpSpPr/>
+          <p:nvPr/>
+        </p:nvGrpSpPr>
+        <p:grpSpPr>
+          <a:xfrm>
+            <a:off x="1931413" y="2482908"/>
+            <a:ext cx="3594967" cy="1853679"/>
+            <a:chOff x="1931413" y="2482908"/>
+            <a:chExt cx="3594967" cy="1853679"/>
+          </a:xfrm>
+        </p:grpSpPr>
+        <p:cxnSp>
+          <p:nvCxnSpPr>
+            <p:cNvPr id="7" name="Straight Arrow Connector 6"/>
+            <p:cNvCxnSpPr>
+              <a:endCxn id="4" idx="1"/>
+            </p:cNvCxnSpPr>
+            <p:nvPr/>
+          </p:nvCxnSpPr>
+          <p:spPr bwMode="auto">
+            <a:xfrm>
+              <a:off x="1951484" y="2637476"/>
+              <a:ext cx="3574896" cy="300535"/>
+            </a:xfrm>
+            <a:prstGeom prst="straightConnector1">
+              <a:avLst/>
+            </a:prstGeom>
+            <a:noFill/>
+            <a:ln w="25400" cap="flat" cmpd="sng" algn="ctr">
+              <a:solidFill>
+                <a:schemeClr val="tx1"/>
+              </a:solidFill>
+              <a:prstDash val="solid"/>
+              <a:round/>
+              <a:headEnd type="triangle"/>
+              <a:tailEnd type="triangle"/>
+            </a:ln>
+            <a:effectLst/>
+          </p:spPr>
+        </p:cxnSp>
+        <p:cxnSp>
+          <p:nvCxnSpPr>
+            <p:cNvPr id="9" name="Straight Arrow Connector 8"/>
+            <p:cNvCxnSpPr>
+              <a:stCxn id="5" idx="3"/>
+            </p:cNvCxnSpPr>
+            <p:nvPr/>
+          </p:nvCxnSpPr>
+          <p:spPr bwMode="auto">
+            <a:xfrm flipV="1">
+              <a:off x="2102713" y="3284985"/>
+              <a:ext cx="3423667" cy="677688"/>
+            </a:xfrm>
+            <a:prstGeom prst="straightConnector1">
+              <a:avLst/>
+            </a:prstGeom>
+            <a:noFill/>
+            <a:ln w="25400" cap="flat" cmpd="sng" algn="ctr">
+              <a:solidFill>
+                <a:schemeClr val="tx1"/>
+              </a:solidFill>
+              <a:prstDash val="solid"/>
+              <a:round/>
+              <a:headEnd type="triangle"/>
+              <a:tailEnd type="triangle"/>
+            </a:ln>
+            <a:effectLst/>
+          </p:spPr>
+        </p:cxnSp>
+        <p:cxnSp>
+          <p:nvCxnSpPr>
+            <p:cNvPr id="12" name="Straight Arrow Connector 11"/>
+            <p:cNvCxnSpPr/>
+            <p:nvPr/>
+          </p:nvCxnSpPr>
+          <p:spPr bwMode="auto">
+            <a:xfrm>
+              <a:off x="1931413" y="2798606"/>
+              <a:ext cx="3574896" cy="300535"/>
+            </a:xfrm>
+            <a:prstGeom prst="straightConnector1">
+              <a:avLst/>
+            </a:prstGeom>
+            <a:noFill/>
+            <a:ln w="25400" cap="flat" cmpd="sng" algn="ctr">
+              <a:solidFill>
+                <a:schemeClr val="tx1"/>
+              </a:solidFill>
+              <a:prstDash val="solid"/>
+              <a:round/>
+              <a:headEnd type="triangle"/>
+              <a:tailEnd type="triangle"/>
+            </a:ln>
+            <a:effectLst/>
+          </p:spPr>
+        </p:cxnSp>
+        <p:cxnSp>
+          <p:nvCxnSpPr>
+            <p:cNvPr id="13" name="Straight Arrow Connector 12"/>
+            <p:cNvCxnSpPr/>
+            <p:nvPr/>
+          </p:nvCxnSpPr>
+          <p:spPr bwMode="auto">
+            <a:xfrm>
+              <a:off x="1941449" y="2482908"/>
+              <a:ext cx="3574896" cy="300535"/>
+            </a:xfrm>
+            <a:prstGeom prst="straightConnector1">
+              <a:avLst/>
+            </a:prstGeom>
+            <a:noFill/>
+            <a:ln w="25400" cap="flat" cmpd="sng" algn="ctr">
+              <a:solidFill>
+                <a:schemeClr val="tx1"/>
+              </a:solidFill>
+              <a:prstDash val="solid"/>
+              <a:round/>
+              <a:headEnd type="triangle"/>
+              <a:tailEnd type="triangle"/>
+            </a:ln>
+            <a:effectLst/>
+          </p:spPr>
+        </p:cxnSp>
+        <p:cxnSp>
+          <p:nvCxnSpPr>
+            <p:cNvPr id="14" name="Straight Arrow Connector 13"/>
+            <p:cNvCxnSpPr/>
+            <p:nvPr/>
+          </p:nvCxnSpPr>
+          <p:spPr bwMode="auto">
+            <a:xfrm flipV="1">
+              <a:off x="1992106" y="3464278"/>
+              <a:ext cx="3534274" cy="677689"/>
+            </a:xfrm>
+            <a:prstGeom prst="straightConnector1">
+              <a:avLst/>
+            </a:prstGeom>
+            <a:noFill/>
+            <a:ln w="25400" cap="flat" cmpd="sng" algn="ctr">
+              <a:solidFill>
+                <a:schemeClr val="tx1"/>
+              </a:solidFill>
+              <a:prstDash val="solid"/>
+              <a:round/>
+              <a:headEnd type="triangle"/>
+              <a:tailEnd type="triangle"/>
+            </a:ln>
+            <a:effectLst/>
+          </p:spPr>
+        </p:cxnSp>
+        <p:cxnSp>
+          <p:nvCxnSpPr>
+            <p:cNvPr id="15" name="Straight Arrow Connector 14"/>
+            <p:cNvCxnSpPr/>
+            <p:nvPr/>
+          </p:nvCxnSpPr>
+          <p:spPr bwMode="auto">
+            <a:xfrm flipV="1">
+              <a:off x="1992106" y="3658898"/>
+              <a:ext cx="3534274" cy="677689"/>
+            </a:xfrm>
+            <a:prstGeom prst="straightConnector1">
+              <a:avLst/>
+            </a:prstGeom>
+            <a:noFill/>
+            <a:ln w="25400" cap="flat" cmpd="sng" algn="ctr">
+              <a:solidFill>
+                <a:schemeClr val="tx1"/>
+              </a:solidFill>
+              <a:prstDash val="solid"/>
+              <a:round/>
+              <a:headEnd type="triangle"/>
+              <a:tailEnd type="triangle"/>
+            </a:ln>
+            <a:effectLst/>
+          </p:spPr>
+        </p:cxnSp>
+      </p:grpSp>
+      <p:sp>
+        <p:nvSpPr>
+          <p:cNvPr id="16" name="TextBox 15"/>
+          <p:cNvSpPr txBox="1"/>
+          <p:nvPr/>
+        </p:nvSpPr>
+        <p:spPr>
+          <a:xfrm>
+            <a:off x="694691" y="5132863"/>
+            <a:ext cx="7813357" cy="1200329"/>
+          </a:xfrm>
+          <a:prstGeom prst="rect">
+            <a:avLst/>
+          </a:prstGeom>
+          <a:solidFill>
+            <a:srgbClr val="00B0F0"/>
+          </a:solidFill>
+        </p:spPr>
+        <p:style>
+          <a:lnRef idx="1">
+            <a:schemeClr val="accent2"/>
+          </a:lnRef>
+          <a:fillRef idx="3">
+            <a:schemeClr val="accent2"/>
+          </a:fillRef>
+          <a:effectRef idx="2">
+            <a:schemeClr val="accent2"/>
+          </a:effectRef>
+          <a:fontRef idx="minor">
+            <a:schemeClr val="lt1"/>
+          </a:fontRef>
+        </p:style>
+        <p:txBody>
+          <a:bodyPr wrap="none" rtlCol="0">
+            <a:spAutoFit/>
+          </a:bodyPr>
+          <a:lstStyle/>
+          <a:p>
+            <a:r>
+              <a:rPr lang="en-US" sz="2400" dirty="0" smtClean="0">
+                <a:solidFill>
+                  <a:schemeClr val="tx1"/>
+                </a:solidFill>
+              </a:rPr>
+              <a:t>One TCP connection per object (video chunks)</a:t>
+            </a:r>
+          </a:p>
+          <a:p>
+            <a:r>
+              <a:rPr lang="en-US" sz="2400" dirty="0" smtClean="0">
+                <a:solidFill>
+                  <a:schemeClr val="tx1"/>
+                </a:solidFill>
+              </a:rPr>
+              <a:t>Building a kind of different transport layer </a:t>
+            </a:r>
+            <a:r>
+              <a:rPr lang="en-US" sz="2400" dirty="0" smtClean="0">
+                <a:solidFill>
+                  <a:schemeClr val="tx1"/>
+                </a:solidFill>
+                <a:sym typeface="Wingdings"/>
+              </a:rPr>
+              <a:t></a:t>
+            </a:r>
+          </a:p>
+          <a:p>
+            <a:r>
+              <a:rPr lang="en-US" sz="2400" dirty="0" smtClean="0">
+                <a:solidFill>
+                  <a:schemeClr val="tx1"/>
+                </a:solidFill>
+                <a:sym typeface="Wingdings"/>
+              </a:rPr>
+              <a:t>Issue with SSL, QUIC is better (re-use of connection ID)</a:t>
+            </a:r>
+            <a:endParaRPr lang="en-US" sz="2400" dirty="0">
+              <a:solidFill>
+                <a:schemeClr val="tx1"/>
+              </a:solidFill>
+            </a:endParaRPr>
+          </a:p>
+        </p:txBody>
+      </p:sp>
+    </p:spTree>
+    <p:extLst>
+      <p:ext uri="{BB962C8B-B14F-4D97-AF65-F5344CB8AC3E}">
+        <p14:creationId xmlns:p14="http://schemas.microsoft.com/office/powerpoint/2010/main" val="288346990"/>
+      </p:ext>
+    </p:extLst>
+  </p:cSld>
+  <p:clrMapOvr>
+    <a:masterClrMapping/>
+  </p:clrMapOvr>
+  <p:timing>
+    <p:tnLst>
+      <p:par>
+        <p:cTn id="1" dur="indefinite" restart="never" nodeType="tmRoot">
+          <p:childTnLst>
+            <p:seq concurrent="1" nextAc="seek">
+              <p:cTn id="2" dur="indefinite" nodeType="mainSeq">
+                <p:childTnLst>
+                  <p:par>
+                    <p:cTn id="3" fill="hold">
+                      <p:stCondLst>
+                        <p:cond delay="indefinite"/>
+                      </p:stCondLst>
+                      <p:childTnLst>
+                        <p:par>
+                          <p:cTn id="4" fill="hold">
+                            <p:stCondLst>
+                              <p:cond delay="0"/>
+                            </p:stCondLst>
+                            <p:childTnLst>
+                              <p:par>
+                                <p:cTn id="5" presetID="1" presetClass="entr" presetSubtype="0" fill="hold" nodeType="clickEffect">
+                                  <p:stCondLst>
+                                    <p:cond delay="0"/>
+                                  </p:stCondLst>
+                                  <p:childTnLst>
+                                    <p:set>
+                                      <p:cBhvr>
+                                        <p:cTn id="6" dur="1" fill="hold">
+                                          <p:stCondLst>
+                                            <p:cond delay="0"/>
+                                          </p:stCondLst>
+                                        </p:cTn>
+                                        <p:tgtEl>
+                                          <p:spTgt spid="17"/>
+                                        </p:tgtEl>
+                                        <p:attrNameLst>
+                                          <p:attrName>style.visibility</p:attrName>
+                                        </p:attrNameLst>
+                                      </p:cBhvr>
+                                      <p:to>
+                                        <p:strVal val="visible"/>
+                                      </p:to>
+                                    </p:set>
+                                  </p:childTnLst>
+                                </p:cTn>
+                              </p:par>
+                            </p:childTnLst>
+                          </p:cTn>
+                        </p:par>
+                      </p:childTnLst>
+                    </p:cTn>
+                  </p:par>
+                </p:childTnLst>
+              </p:cTn>
+              <p:prevCondLst>
+                <p:cond evt="onPrev" delay="0">
+                  <p:tgtEl>
+                    <p:sldTgt/>
+                  </p:tgtEl>
+                </p:cond>
+              </p:prevCondLst>
+              <p:nextCondLst>
+                <p:cond evt="onNext" delay="0">
+                  <p:tgtEl>
+                    <p:sldTgt/>
+                  </p:tgtEl>
+                </p:cond>
+              </p:nextCondLst>
+            </p:seq>
+          </p:childTnLst>
+        </p:cTn>
       </p:par>
     </p:tnLst>
   </p:timing>

</xml_diff>